<commit_message>
Rewrite references to more readable format
</commit_message>
<xml_diff>
--- a/Data Visualization pt. 1/Data Visualization pt. 1.pptx
+++ b/Data Visualization pt. 1/Data Visualization pt. 1.pptx
@@ -17264,7 +17264,7 @@
                   <a:schemeClr val="dk1"/>
                 </a:solidFill>
               </a:rPr>
-              <a:t>Overlaping </a:t>
+              <a:t>Overlapping </a:t>
             </a:r>
             <a:r>
               <a:rPr lang="pl" sz="3200">
@@ -19898,8 +19898,8 @@
         </p:nvSpPr>
         <p:spPr>
           <a:xfrm>
-            <a:off x="493425" y="1547525"/>
-            <a:ext cx="8156400" cy="3042900"/>
+            <a:off x="493425" y="1158775"/>
+            <a:ext cx="8156400" cy="3431400"/>
           </a:xfrm>
           <a:prstGeom prst="rect">
             <a:avLst/>
@@ -19915,7 +19915,7 @@
           </a:bodyPr>
           <a:lstStyle/>
           <a:p>
-            <a:pPr indent="-298450" lvl="0" marL="457200" rtl="0" algn="l">
+            <a:pPr indent="0" lvl="0" marL="0" rtl="0" algn="l">
               <a:lnSpc>
                 <a:spcPct val="115000"/>
               </a:lnSpc>
@@ -19925,12 +19925,31 @@
               <a:spcAft>
                 <a:spcPts val="0"/>
               </a:spcAft>
-              <a:buClr>
-                <a:schemeClr val="dk2"/>
-              </a:buClr>
-              <a:buSzPts val="1100"/>
-              <a:buChar char="●"/>
+              <a:buNone/>
             </a:pPr>
+            <a:r>
+              <a:rPr b="1" lang="pl" sz="1100"/>
+              <a:t>Information sources:</a:t>
+            </a:r>
+            <a:endParaRPr b="1" sz="1100"/>
+          </a:p>
+          <a:p>
+            <a:pPr indent="0" lvl="0" marL="0" rtl="0" algn="l">
+              <a:lnSpc>
+                <a:spcPct val="115000"/>
+              </a:lnSpc>
+              <a:spcBef>
+                <a:spcPts val="0"/>
+              </a:spcBef>
+              <a:spcAft>
+                <a:spcPts val="0"/>
+              </a:spcAft>
+              <a:buNone/>
+            </a:pPr>
+            <a:r>
+              <a:rPr lang="pl" sz="1100"/>
+              <a:t>[1] Wes McKinney, </a:t>
+            </a:r>
             <a:r>
               <a:rPr lang="pl" sz="1100" u="sng">
                 <a:solidFill>
@@ -19938,12 +19957,16 @@
                 </a:solidFill>
                 <a:hlinkClick r:id="rId3"/>
               </a:rPr>
-              <a:t>https://github.com/Skamlo/Visualization-Techniques-in-Python</a:t>
+              <a:t>Python for Data Analysis, 3E</a:t>
+            </a:r>
+            <a:r>
+              <a:rPr lang="pl" sz="1100"/>
+              <a:t> (2022), Wes’s Blog</a:t>
             </a:r>
             <a:endParaRPr sz="1100"/>
           </a:p>
           <a:p>
-            <a:pPr indent="-298450" lvl="0" marL="457200" rtl="0" algn="l">
+            <a:pPr indent="0" lvl="0" marL="0" rtl="0" algn="l">
               <a:lnSpc>
                 <a:spcPct val="115000"/>
               </a:lnSpc>
@@ -19953,9 +19976,12 @@
               <a:spcAft>
                 <a:spcPts val="0"/>
               </a:spcAft>
-              <a:buSzPts val="1100"/>
-              <a:buChar char="●"/>
+              <a:buNone/>
             </a:pPr>
+            <a:r>
+              <a:rPr lang="pl" sz="1100"/>
+              <a:t>[2] Claus O. Wilke, </a:t>
+            </a:r>
             <a:r>
               <a:rPr lang="pl" sz="1100" u="sng">
                 <a:solidFill>
@@ -19963,12 +19989,16 @@
                 </a:solidFill>
                 <a:hlinkClick r:id="rId4"/>
               </a:rPr>
-              <a:t>https://towardsdatascience.com/kernel-density-estimation-explained-step-by-step-7cc5b5bc4517</a:t>
+              <a:t>Fundamentals of Data Visualization </a:t>
+            </a:r>
+            <a:r>
+              <a:rPr lang="pl" sz="1100"/>
+              <a:t>(2019), Claus Website</a:t>
             </a:r>
             <a:endParaRPr sz="1100"/>
           </a:p>
           <a:p>
-            <a:pPr indent="-298450" lvl="0" marL="457200" rtl="0" algn="l">
+            <a:pPr indent="0" lvl="0" marL="0" rtl="0" algn="l">
               <a:lnSpc>
                 <a:spcPct val="115000"/>
               </a:lnSpc>
@@ -19978,9 +20008,12 @@
               <a:spcAft>
                 <a:spcPts val="0"/>
               </a:spcAft>
-              <a:buSzPts val="1100"/>
-              <a:buChar char="●"/>
+              <a:buNone/>
             </a:pPr>
+            <a:r>
+              <a:rPr lang="pl" sz="1100"/>
+              <a:t>[3] Jarosław Drapala, </a:t>
+            </a:r>
             <a:r>
               <a:rPr lang="pl" sz="1100" u="sng">
                 <a:solidFill>
@@ -19988,12 +20021,16 @@
                 </a:solidFill>
                 <a:hlinkClick r:id="rId5"/>
               </a:rPr>
-              <a:t>https://www.kaggle.com/datasets/brendan45774/test-file</a:t>
+              <a:t>Kernel Density Estimator explained step by step</a:t>
+            </a:r>
+            <a:r>
+              <a:rPr lang="pl" sz="1100"/>
+              <a:t> (2023), Medium - Towards Data Science</a:t>
             </a:r>
             <a:endParaRPr sz="1100"/>
           </a:p>
           <a:p>
-            <a:pPr indent="-298450" lvl="0" marL="457200" rtl="0" algn="l">
+            <a:pPr indent="0" lvl="0" marL="0" rtl="0" algn="l">
               <a:lnSpc>
                 <a:spcPct val="115000"/>
               </a:lnSpc>
@@ -20003,49 +20040,12 @@
               <a:spcAft>
                 <a:spcPts val="0"/>
               </a:spcAft>
-              <a:buSzPts val="1100"/>
-              <a:buChar char="●"/>
+              <a:buNone/>
             </a:pPr>
             <a:r>
               <a:rPr lang="pl" sz="1100"/>
-              <a:t>https://stat.gov.pl/sygnalne/komunikaty-i-obwieszczenia/lista-komunikatow-i-obwieszczen/obwieszczenie-w-sprawie-wysokosci-przecietnego-miesiecznego-wynagrodzenia-brutto-w-gospodarce-narodowej-w-wojewodztwach-w-2022-roku,295,9.html</a:t>
+              <a:t>[4] 3Blue1Brown (Grant Sanderson), </a:t>
             </a:r>
-            <a:endParaRPr sz="1100"/>
-          </a:p>
-          <a:p>
-            <a:pPr indent="-298450" lvl="0" marL="457200" rtl="0" algn="l">
-              <a:lnSpc>
-                <a:spcPct val="115000"/>
-              </a:lnSpc>
-              <a:spcBef>
-                <a:spcPts val="0"/>
-              </a:spcBef>
-              <a:spcAft>
-                <a:spcPts val="0"/>
-              </a:spcAft>
-              <a:buSzPts val="1100"/>
-              <a:buChar char="●"/>
-            </a:pPr>
-            <a:r>
-              <a:rPr lang="pl" sz="1100"/>
-              <a:t>https://www.zus.pl/baza-wiedzy/skladki-wskazniki-odsetki/wskazniki/przecietne-wynagrodzenie-w-latach</a:t>
-            </a:r>
-            <a:endParaRPr sz="1100"/>
-          </a:p>
-          <a:p>
-            <a:pPr indent="-298450" lvl="0" marL="457200" rtl="0" algn="l">
-              <a:lnSpc>
-                <a:spcPct val="115000"/>
-              </a:lnSpc>
-              <a:spcBef>
-                <a:spcPts val="0"/>
-              </a:spcBef>
-              <a:spcAft>
-                <a:spcPts val="0"/>
-              </a:spcAft>
-              <a:buSzPts val="1100"/>
-              <a:buChar char="●"/>
-            </a:pPr>
             <a:r>
               <a:rPr lang="pl" sz="1100" u="sng">
                 <a:solidFill>
@@ -20053,12 +20053,16 @@
                 </a:solidFill>
                 <a:hlinkClick r:id="rId6"/>
               </a:rPr>
-              <a:t>https://www.kaggle.com/datasets/aleksandrglotov/car-prices-poland</a:t>
+              <a:t>Why π is in the normal distribution (beyond integral tricks)</a:t>
+            </a:r>
+            <a:r>
+              <a:rPr lang="pl" sz="1100"/>
+              <a:t> (2023), Youtube</a:t>
             </a:r>
             <a:endParaRPr sz="1100"/>
           </a:p>
           <a:p>
-            <a:pPr indent="-298450" lvl="0" marL="457200" rtl="0" algn="l">
+            <a:pPr indent="0" lvl="0" marL="0" rtl="0" algn="l">
               <a:lnSpc>
                 <a:spcPct val="115000"/>
               </a:lnSpc>
@@ -20068,9 +20072,49 @@
               <a:spcAft>
                 <a:spcPts val="0"/>
               </a:spcAft>
-              <a:buSzPts val="1100"/>
-              <a:buChar char="●"/>
+              <a:buNone/>
             </a:pPr>
+            <a:r>
+              <a:t/>
+            </a:r>
+            <a:endParaRPr sz="1100"/>
+          </a:p>
+          <a:p>
+            <a:pPr indent="0" lvl="0" marL="0" rtl="0" algn="l">
+              <a:lnSpc>
+                <a:spcPct val="115000"/>
+              </a:lnSpc>
+              <a:spcBef>
+                <a:spcPts val="0"/>
+              </a:spcBef>
+              <a:spcAft>
+                <a:spcPts val="0"/>
+              </a:spcAft>
+              <a:buNone/>
+            </a:pPr>
+            <a:r>
+              <a:rPr b="1" lang="pl" sz="1100"/>
+              <a:t>Data sources:</a:t>
+            </a:r>
+            <a:endParaRPr b="1" sz="1100"/>
+          </a:p>
+          <a:p>
+            <a:pPr indent="0" lvl="0" marL="0" rtl="0" algn="l">
+              <a:lnSpc>
+                <a:spcPct val="115000"/>
+              </a:lnSpc>
+              <a:spcBef>
+                <a:spcPts val="0"/>
+              </a:spcBef>
+              <a:spcAft>
+                <a:spcPts val="0"/>
+              </a:spcAft>
+              <a:buNone/>
+            </a:pPr>
+            <a:r>
+              <a:rPr lang="pl" sz="1100"/>
+              <a:t>[5] Brenda N, </a:t>
+            </a:r>
             <a:r>
               <a:rPr lang="pl" sz="1100" u="sng">
                 <a:solidFill>
@@ -20078,12 +20122,16 @@
                 </a:solidFill>
                 <a:hlinkClick r:id="rId7"/>
               </a:rPr>
-              <a:t>https://towardsdatascience.com/kernel-density-estimation-explained-step-by-step-7cc5b5bc4517</a:t>
+              <a:t>Titanic dataset</a:t>
+            </a:r>
+            <a:r>
+              <a:rPr lang="pl" sz="1100"/>
+              <a:t> (2021), Kaggle</a:t>
             </a:r>
             <a:endParaRPr sz="1100"/>
           </a:p>
           <a:p>
-            <a:pPr indent="-298450" lvl="0" marL="457200" rtl="0" algn="l">
+            <a:pPr indent="0" lvl="0" marL="0" rtl="0" algn="l">
               <a:lnSpc>
                 <a:spcPct val="115000"/>
               </a:lnSpc>
@@ -20093,14 +20141,187 @@
               <a:spcAft>
                 <a:spcPts val="0"/>
               </a:spcAft>
-              <a:buSzPts val="1100"/>
-              <a:buChar char="●"/>
+              <a:buNone/>
             </a:pPr>
             <a:r>
               <a:rPr lang="pl" sz="1100"/>
-              <a:t>https://www.youtube.com/watch?v=cy8r7WSuT1I</a:t>
+              <a:t>[6] </a:t>
+            </a:r>
+            <a:r>
+              <a:rPr lang="pl" sz="1050">
+                <a:solidFill>
+                  <a:srgbClr val="222222"/>
+                </a:solidFill>
+                <a:highlight>
+                  <a:srgbClr val="FDFDFD"/>
+                </a:highlight>
+              </a:rPr>
+              <a:t>Główny Urząd Statystyczny, </a:t>
+            </a:r>
+            <a:r>
+              <a:rPr lang="pl" sz="1050" u="sng">
+                <a:solidFill>
+                  <a:schemeClr val="hlink"/>
+                </a:solidFill>
+                <a:highlight>
+                  <a:srgbClr val="FDFDFD"/>
+                </a:highlight>
+                <a:hlinkClick r:id="rId8"/>
+              </a:rPr>
+              <a:t>Obwieszczenie w sprawie wysokości przeciętnego miesięcznego wynagrodzenia brutto w gospodarce narodowej w województwach w 2022 roku</a:t>
+            </a:r>
+            <a:r>
+              <a:rPr lang="pl" sz="1100"/>
+              <a:t> (2023), GUS</a:t>
             </a:r>
             <a:endParaRPr sz="1100"/>
+          </a:p>
+          <a:p>
+            <a:pPr indent="0" lvl="0" marL="0" rtl="0" algn="l">
+              <a:lnSpc>
+                <a:spcPct val="115000"/>
+              </a:lnSpc>
+              <a:spcBef>
+                <a:spcPts val="0"/>
+              </a:spcBef>
+              <a:spcAft>
+                <a:spcPts val="0"/>
+              </a:spcAft>
+              <a:buNone/>
+            </a:pPr>
+            <a:r>
+              <a:rPr lang="pl" sz="1100"/>
+              <a:t>[7] Aleksandr Glotov, </a:t>
+            </a:r>
+            <a:r>
+              <a:rPr lang="pl" sz="1100" u="sng">
+                <a:solidFill>
+                  <a:schemeClr val="hlink"/>
+                </a:solidFill>
+                <a:hlinkClick r:id="rId9"/>
+              </a:rPr>
+              <a:t>Car Prices Poland</a:t>
+            </a:r>
+            <a:r>
+              <a:rPr lang="pl" sz="1100"/>
+              <a:t> (2021), Kaggle</a:t>
+            </a:r>
+            <a:endParaRPr sz="1100"/>
+          </a:p>
+          <a:p>
+            <a:pPr indent="0" lvl="0" marL="0" rtl="0" algn="l">
+              <a:lnSpc>
+                <a:spcPct val="115000"/>
+              </a:lnSpc>
+              <a:spcBef>
+                <a:spcPts val="0"/>
+              </a:spcBef>
+              <a:spcAft>
+                <a:spcPts val="0"/>
+              </a:spcAft>
+              <a:buNone/>
+            </a:pPr>
+            <a:r>
+              <a:t/>
+            </a:r>
+            <a:endParaRPr sz="1100"/>
+          </a:p>
+          <a:p>
+            <a:pPr indent="0" lvl="0" marL="0" rtl="0" algn="l">
+              <a:lnSpc>
+                <a:spcPct val="115000"/>
+              </a:lnSpc>
+              <a:spcBef>
+                <a:spcPts val="0"/>
+              </a:spcBef>
+              <a:spcAft>
+                <a:spcPts val="0"/>
+              </a:spcAft>
+              <a:buNone/>
+            </a:pPr>
+            <a:r>
+              <a:rPr b="1" lang="pl" sz="1100"/>
+              <a:t>Other:</a:t>
+            </a:r>
+            <a:endParaRPr b="1" sz="1100"/>
+          </a:p>
+          <a:p>
+            <a:pPr indent="0" lvl="0" marL="0" rtl="0" algn="l">
+              <a:lnSpc>
+                <a:spcPct val="115000"/>
+              </a:lnSpc>
+              <a:spcBef>
+                <a:spcPts val="0"/>
+              </a:spcBef>
+              <a:spcAft>
+                <a:spcPts val="0"/>
+              </a:spcAft>
+              <a:buNone/>
+            </a:pPr>
+            <a:r>
+              <a:rPr lang="pl" sz="1100"/>
+              <a:t>[8] </a:t>
+            </a:r>
+            <a:r>
+              <a:rPr lang="pl" sz="1100" u="sng">
+                <a:solidFill>
+                  <a:schemeClr val="hlink"/>
+                </a:solidFill>
+                <a:hlinkClick r:id="rId10"/>
+              </a:rPr>
+              <a:t>My private notes about data visualization an examples</a:t>
+            </a:r>
+            <a:endParaRPr sz="1100"/>
+          </a:p>
+        </p:txBody>
+      </p:sp>
+      <p:sp>
+        <p:nvSpPr>
+          <p:cNvPr id="498" name="Google Shape;498;p83"/>
+          <p:cNvSpPr txBox="1"/>
+          <p:nvPr/>
+        </p:nvSpPr>
+        <p:spPr>
+          <a:xfrm>
+            <a:off x="493425" y="4590275"/>
+            <a:ext cx="8338800" cy="381300"/>
+          </a:xfrm>
+          <a:prstGeom prst="rect">
+            <a:avLst/>
+          </a:prstGeom>
+          <a:noFill/>
+          <a:ln>
+            <a:noFill/>
+          </a:ln>
+        </p:spPr>
+        <p:txBody>
+          <a:bodyPr anchorCtr="0" anchor="t" bIns="91425" lIns="91425" spcFirstLastPara="1" rIns="91425" wrap="square" tIns="91425">
+            <a:noAutofit/>
+          </a:bodyPr>
+          <a:lstStyle/>
+          <a:p>
+            <a:pPr indent="0" lvl="0" marL="0" rtl="0" algn="ctr">
+              <a:spcBef>
+                <a:spcPts val="0"/>
+              </a:spcBef>
+              <a:spcAft>
+                <a:spcPts val="0"/>
+              </a:spcAft>
+              <a:buNone/>
+            </a:pPr>
+            <a:r>
+              <a:rPr lang="pl" sz="1100">
+                <a:solidFill>
+                  <a:schemeClr val="dk2"/>
+                </a:solidFill>
+              </a:rPr>
+              <a:t>Presentation author: Maksymilian Norkiewicz</a:t>
+            </a:r>
+            <a:endParaRPr sz="1100">
+              <a:solidFill>
+                <a:schemeClr val="dk2"/>
+              </a:solidFill>
+            </a:endParaRPr>
           </a:p>
         </p:txBody>
       </p:sp>
@@ -20709,6 +20930,285 @@
 </file>
 
 <file path=ppt/theme/theme1.xml><?xml version="1.0" encoding="utf-8"?>
+<a:theme xmlns:a="http://schemas.openxmlformats.org/drawingml/2006/main" xmlns:r="http://schemas.openxmlformats.org/officeDocument/2006/relationships" name="Simple Light">
+  <a:themeElements>
+    <a:clrScheme name="Simple Light">
+      <a:dk1>
+        <a:srgbClr val="000000"/>
+      </a:dk1>
+      <a:lt1>
+        <a:srgbClr val="FFFFFF"/>
+      </a:lt1>
+      <a:dk2>
+        <a:srgbClr val="595959"/>
+      </a:dk2>
+      <a:lt2>
+        <a:srgbClr val="EEEEEE"/>
+      </a:lt2>
+      <a:accent1>
+        <a:srgbClr val="4285F4"/>
+      </a:accent1>
+      <a:accent2>
+        <a:srgbClr val="212121"/>
+      </a:accent2>
+      <a:accent3>
+        <a:srgbClr val="78909C"/>
+      </a:accent3>
+      <a:accent4>
+        <a:srgbClr val="FFAB40"/>
+      </a:accent4>
+      <a:accent5>
+        <a:srgbClr val="0097A7"/>
+      </a:accent5>
+      <a:accent6>
+        <a:srgbClr val="EEFF41"/>
+      </a:accent6>
+      <a:hlink>
+        <a:srgbClr val="0097A7"/>
+      </a:hlink>
+      <a:folHlink>
+        <a:srgbClr val="0097A7"/>
+      </a:folHlink>
+    </a:clrScheme>
+    <a:fontScheme name="Office">
+      <a:majorFont>
+        <a:latin typeface="Arial"/>
+        <a:ea typeface=""/>
+        <a:cs typeface=""/>
+        <a:font script="Jpan" typeface="ＭＳ Ｐゴシック"/>
+        <a:font script="Hang" typeface="맑은 고딕"/>
+        <a:font script="Hans" typeface="宋体"/>
+        <a:font script="Hant" typeface="新細明體"/>
+        <a:font script="Arab" typeface="Times New Roman"/>
+        <a:font script="Hebr" typeface="Times New Roman"/>
+        <a:font script="Thai" typeface="Angsana New"/>
+        <a:font script="Ethi" typeface="Nyala"/>
+        <a:font script="Beng" typeface="Vrinda"/>
+        <a:font script="Gujr" typeface="Shruti"/>
+        <a:font script="Khmr" typeface="MoolBoran"/>
+        <a:font script="Knda" typeface="Tunga"/>
+        <a:font script="Guru" typeface="Raavi"/>
+        <a:font script="Cans" typeface="Euphemia"/>
+        <a:font script="Cher" typeface="Plantagenet Cherokee"/>
+        <a:font script="Yiii" typeface="Microsoft Yi Baiti"/>
+        <a:font script="Tibt" typeface="Microsoft Himalaya"/>
+        <a:font script="Thaa" typeface="MV Boli"/>
+        <a:font script="Deva" typeface="Mangal"/>
+        <a:font script="Telu" typeface="Gautami"/>
+        <a:font script="Taml" typeface="Latha"/>
+        <a:font script="Syrc" typeface="Estrangelo Edessa"/>
+        <a:font script="Orya" typeface="Kalinga"/>
+        <a:font script="Mlym" typeface="Kartika"/>
+        <a:font script="Laoo" typeface="DokChampa"/>
+        <a:font script="Sinh" typeface="Iskoola Pota"/>
+        <a:font script="Mong" typeface="Mongolian Baiti"/>
+        <a:font script="Viet" typeface="Times New Roman"/>
+        <a:font script="Uigh" typeface="Microsoft Uighur"/>
+        <a:font script="Geor" typeface="Sylfaen"/>
+      </a:majorFont>
+      <a:minorFont>
+        <a:latin typeface="Arial"/>
+        <a:ea typeface=""/>
+        <a:cs typeface=""/>
+        <a:font script="Jpan" typeface="ＭＳ Ｐゴシック"/>
+        <a:font script="Hang" typeface="맑은 고딕"/>
+        <a:font script="Hans" typeface="宋体"/>
+        <a:font script="Hant" typeface="新細明體"/>
+        <a:font script="Arab" typeface="Arial"/>
+        <a:font script="Hebr" typeface="Arial"/>
+        <a:font script="Thai" typeface="Cordia New"/>
+        <a:font script="Ethi" typeface="Nyala"/>
+        <a:font script="Beng" typeface="Vrinda"/>
+        <a:font script="Gujr" typeface="Shruti"/>
+        <a:font script="Khmr" typeface="DaunPenh"/>
+        <a:font script="Knda" typeface="Tunga"/>
+        <a:font script="Guru" typeface="Raavi"/>
+        <a:font script="Cans" typeface="Euphemia"/>
+        <a:font script="Cher" typeface="Plantagenet Cherokee"/>
+        <a:font script="Yiii" typeface="Microsoft Yi Baiti"/>
+        <a:font script="Tibt" typeface="Microsoft Himalaya"/>
+        <a:font script="Thaa" typeface="MV Boli"/>
+        <a:font script="Deva" typeface="Mangal"/>
+        <a:font script="Telu" typeface="Gautami"/>
+        <a:font script="Taml" typeface="Latha"/>
+        <a:font script="Syrc" typeface="Estrangelo Edessa"/>
+        <a:font script="Orya" typeface="Kalinga"/>
+        <a:font script="Mlym" typeface="Kartika"/>
+        <a:font script="Laoo" typeface="DokChampa"/>
+        <a:font script="Sinh" typeface="Iskoola Pota"/>
+        <a:font script="Mong" typeface="Mongolian Baiti"/>
+        <a:font script="Viet" typeface="Arial"/>
+        <a:font script="Uigh" typeface="Microsoft Uighur"/>
+        <a:font script="Geor" typeface="Sylfaen"/>
+      </a:minorFont>
+    </a:fontScheme>
+    <a:fmtScheme name="Office">
+      <a:fillStyleLst>
+        <a:solidFill>
+          <a:schemeClr val="phClr"/>
+        </a:solidFill>
+        <a:gradFill rotWithShape="1">
+          <a:gsLst>
+            <a:gs pos="0">
+              <a:schemeClr val="phClr">
+                <a:tint val="50000"/>
+                <a:satMod val="300000"/>
+              </a:schemeClr>
+            </a:gs>
+            <a:gs pos="35000">
+              <a:schemeClr val="phClr">
+                <a:tint val="37000"/>
+                <a:satMod val="300000"/>
+              </a:schemeClr>
+            </a:gs>
+            <a:gs pos="100000">
+              <a:schemeClr val="phClr">
+                <a:tint val="15000"/>
+                <a:satMod val="350000"/>
+              </a:schemeClr>
+            </a:gs>
+          </a:gsLst>
+          <a:lin ang="16200000" scaled="1"/>
+        </a:gradFill>
+        <a:gradFill rotWithShape="1">
+          <a:gsLst>
+            <a:gs pos="0">
+              <a:schemeClr val="phClr">
+                <a:tint val="100000"/>
+                <a:shade val="100000"/>
+                <a:satMod val="130000"/>
+              </a:schemeClr>
+            </a:gs>
+            <a:gs pos="100000">
+              <a:schemeClr val="phClr">
+                <a:tint val="50000"/>
+                <a:shade val="100000"/>
+                <a:satMod val="350000"/>
+              </a:schemeClr>
+            </a:gs>
+          </a:gsLst>
+          <a:lin ang="16200000" scaled="0"/>
+        </a:gradFill>
+      </a:fillStyleLst>
+      <a:lnStyleLst>
+        <a:ln w="9525" cap="flat" cmpd="sng" algn="ctr">
+          <a:solidFill>
+            <a:schemeClr val="phClr">
+              <a:shade val="95000"/>
+              <a:satMod val="105000"/>
+            </a:schemeClr>
+          </a:solidFill>
+          <a:prstDash val="solid"/>
+        </a:ln>
+        <a:ln w="25400" cap="flat" cmpd="sng" algn="ctr">
+          <a:solidFill>
+            <a:schemeClr val="phClr"/>
+          </a:solidFill>
+          <a:prstDash val="solid"/>
+        </a:ln>
+        <a:ln w="38100" cap="flat" cmpd="sng" algn="ctr">
+          <a:solidFill>
+            <a:schemeClr val="phClr"/>
+          </a:solidFill>
+          <a:prstDash val="solid"/>
+        </a:ln>
+      </a:lnStyleLst>
+      <a:effectStyleLst>
+        <a:effectStyle>
+          <a:effectLst>
+            <a:outerShdw blurRad="40000" dist="20000" dir="5400000" rotWithShape="0">
+              <a:srgbClr val="000000">
+                <a:alpha val="38000"/>
+              </a:srgbClr>
+            </a:outerShdw>
+          </a:effectLst>
+        </a:effectStyle>
+        <a:effectStyle>
+          <a:effectLst>
+            <a:outerShdw blurRad="40000" dist="23000" dir="5400000" rotWithShape="0">
+              <a:srgbClr val="000000">
+                <a:alpha val="35000"/>
+              </a:srgbClr>
+            </a:outerShdw>
+          </a:effectLst>
+        </a:effectStyle>
+        <a:effectStyle>
+          <a:effectLst>
+            <a:outerShdw blurRad="40000" dist="23000" dir="5400000" rotWithShape="0">
+              <a:srgbClr val="000000">
+                <a:alpha val="35000"/>
+              </a:srgbClr>
+            </a:outerShdw>
+          </a:effectLst>
+          <a:scene3d>
+            <a:camera prst="orthographicFront">
+              <a:rot lat="0" lon="0" rev="0"/>
+            </a:camera>
+            <a:lightRig rig="threePt" dir="t">
+              <a:rot lat="0" lon="0" rev="1200000"/>
+            </a:lightRig>
+          </a:scene3d>
+          <a:sp3d>
+            <a:bevelT w="63500" h="25400"/>
+          </a:sp3d>
+        </a:effectStyle>
+      </a:effectStyleLst>
+      <a:bgFillStyleLst>
+        <a:solidFill>
+          <a:schemeClr val="phClr"/>
+        </a:solidFill>
+        <a:gradFill rotWithShape="1">
+          <a:gsLst>
+            <a:gs pos="0">
+              <a:schemeClr val="phClr">
+                <a:tint val="40000"/>
+                <a:satMod val="350000"/>
+              </a:schemeClr>
+            </a:gs>
+            <a:gs pos="40000">
+              <a:schemeClr val="phClr">
+                <a:tint val="45000"/>
+                <a:shade val="99000"/>
+                <a:satMod val="350000"/>
+              </a:schemeClr>
+            </a:gs>
+            <a:gs pos="100000">
+              <a:schemeClr val="phClr">
+                <a:shade val="20000"/>
+                <a:satMod val="255000"/>
+              </a:schemeClr>
+            </a:gs>
+          </a:gsLst>
+          <a:path path="circle">
+            <a:fillToRect l="50000" t="-80000" r="50000" b="180000"/>
+          </a:path>
+        </a:gradFill>
+        <a:gradFill rotWithShape="1">
+          <a:gsLst>
+            <a:gs pos="0">
+              <a:schemeClr val="phClr">
+                <a:tint val="80000"/>
+                <a:satMod val="300000"/>
+              </a:schemeClr>
+            </a:gs>
+            <a:gs pos="100000">
+              <a:schemeClr val="phClr">
+                <a:shade val="30000"/>
+                <a:satMod val="200000"/>
+              </a:schemeClr>
+            </a:gs>
+          </a:gsLst>
+          <a:path path="circle">
+            <a:fillToRect l="50000" t="50000" r="50000" b="50000"/>
+          </a:path>
+        </a:gradFill>
+      </a:bgFillStyleLst>
+    </a:fmtScheme>
+  </a:themeElements>
+</a:theme>
+</file>
+
+<file path=ppt/theme/theme2.xml><?xml version="1.0" encoding="utf-8"?>
 <a:theme xmlns:a="http://schemas.openxmlformats.org/drawingml/2006/main" xmlns:r="http://schemas.openxmlformats.org/officeDocument/2006/relationships">
   <a:themeElements>
     <a:clrScheme name="Default">
@@ -20985,283 +21485,4 @@
     </a:fmtScheme>
   </a:themeElements>
 </a:theme>
-</file>
-
-<file path=ppt/theme/theme2.xml><?xml version="1.0" encoding="utf-8"?>
-<a:theme xmlns:a="http://schemas.openxmlformats.org/drawingml/2006/main" xmlns:r="http://schemas.openxmlformats.org/officeDocument/2006/relationships" name="Simple Light">
-  <a:themeElements>
-    <a:clrScheme name="Simple Light">
-      <a:dk1>
-        <a:srgbClr val="000000"/>
-      </a:dk1>
-      <a:lt1>
-        <a:srgbClr val="FFFFFF"/>
-      </a:lt1>
-      <a:dk2>
-        <a:srgbClr val="595959"/>
-      </a:dk2>
-      <a:lt2>
-        <a:srgbClr val="EEEEEE"/>
-      </a:lt2>
-      <a:accent1>
-        <a:srgbClr val="4285F4"/>
-      </a:accent1>
-      <a:accent2>
-        <a:srgbClr val="212121"/>
-      </a:accent2>
-      <a:accent3>
-        <a:srgbClr val="78909C"/>
-      </a:accent3>
-      <a:accent4>
-        <a:srgbClr val="FFAB40"/>
-      </a:accent4>
-      <a:accent5>
-        <a:srgbClr val="0097A7"/>
-      </a:accent5>
-      <a:accent6>
-        <a:srgbClr val="EEFF41"/>
-      </a:accent6>
-      <a:hlink>
-        <a:srgbClr val="0097A7"/>
-      </a:hlink>
-      <a:folHlink>
-        <a:srgbClr val="0097A7"/>
-      </a:folHlink>
-    </a:clrScheme>
-    <a:fontScheme name="Office">
-      <a:majorFont>
-        <a:latin typeface="Arial"/>
-        <a:ea typeface=""/>
-        <a:cs typeface=""/>
-        <a:font script="Jpan" typeface="ＭＳ Ｐゴシック"/>
-        <a:font script="Hang" typeface="맑은 고딕"/>
-        <a:font script="Hans" typeface="宋体"/>
-        <a:font script="Hant" typeface="新細明體"/>
-        <a:font script="Arab" typeface="Times New Roman"/>
-        <a:font script="Hebr" typeface="Times New Roman"/>
-        <a:font script="Thai" typeface="Angsana New"/>
-        <a:font script="Ethi" typeface="Nyala"/>
-        <a:font script="Beng" typeface="Vrinda"/>
-        <a:font script="Gujr" typeface="Shruti"/>
-        <a:font script="Khmr" typeface="MoolBoran"/>
-        <a:font script="Knda" typeface="Tunga"/>
-        <a:font script="Guru" typeface="Raavi"/>
-        <a:font script="Cans" typeface="Euphemia"/>
-        <a:font script="Cher" typeface="Plantagenet Cherokee"/>
-        <a:font script="Yiii" typeface="Microsoft Yi Baiti"/>
-        <a:font script="Tibt" typeface="Microsoft Himalaya"/>
-        <a:font script="Thaa" typeface="MV Boli"/>
-        <a:font script="Deva" typeface="Mangal"/>
-        <a:font script="Telu" typeface="Gautami"/>
-        <a:font script="Taml" typeface="Latha"/>
-        <a:font script="Syrc" typeface="Estrangelo Edessa"/>
-        <a:font script="Orya" typeface="Kalinga"/>
-        <a:font script="Mlym" typeface="Kartika"/>
-        <a:font script="Laoo" typeface="DokChampa"/>
-        <a:font script="Sinh" typeface="Iskoola Pota"/>
-        <a:font script="Mong" typeface="Mongolian Baiti"/>
-        <a:font script="Viet" typeface="Times New Roman"/>
-        <a:font script="Uigh" typeface="Microsoft Uighur"/>
-        <a:font script="Geor" typeface="Sylfaen"/>
-      </a:majorFont>
-      <a:minorFont>
-        <a:latin typeface="Arial"/>
-        <a:ea typeface=""/>
-        <a:cs typeface=""/>
-        <a:font script="Jpan" typeface="ＭＳ Ｐゴシック"/>
-        <a:font script="Hang" typeface="맑은 고딕"/>
-        <a:font script="Hans" typeface="宋体"/>
-        <a:font script="Hant" typeface="新細明體"/>
-        <a:font script="Arab" typeface="Arial"/>
-        <a:font script="Hebr" typeface="Arial"/>
-        <a:font script="Thai" typeface="Cordia New"/>
-        <a:font script="Ethi" typeface="Nyala"/>
-        <a:font script="Beng" typeface="Vrinda"/>
-        <a:font script="Gujr" typeface="Shruti"/>
-        <a:font script="Khmr" typeface="DaunPenh"/>
-        <a:font script="Knda" typeface="Tunga"/>
-        <a:font script="Guru" typeface="Raavi"/>
-        <a:font script="Cans" typeface="Euphemia"/>
-        <a:font script="Cher" typeface="Plantagenet Cherokee"/>
-        <a:font script="Yiii" typeface="Microsoft Yi Baiti"/>
-        <a:font script="Tibt" typeface="Microsoft Himalaya"/>
-        <a:font script="Thaa" typeface="MV Boli"/>
-        <a:font script="Deva" typeface="Mangal"/>
-        <a:font script="Telu" typeface="Gautami"/>
-        <a:font script="Taml" typeface="Latha"/>
-        <a:font script="Syrc" typeface="Estrangelo Edessa"/>
-        <a:font script="Orya" typeface="Kalinga"/>
-        <a:font script="Mlym" typeface="Kartika"/>
-        <a:font script="Laoo" typeface="DokChampa"/>
-        <a:font script="Sinh" typeface="Iskoola Pota"/>
-        <a:font script="Mong" typeface="Mongolian Baiti"/>
-        <a:font script="Viet" typeface="Arial"/>
-        <a:font script="Uigh" typeface="Microsoft Uighur"/>
-        <a:font script="Geor" typeface="Sylfaen"/>
-      </a:minorFont>
-    </a:fontScheme>
-    <a:fmtScheme name="Office">
-      <a:fillStyleLst>
-        <a:solidFill>
-          <a:schemeClr val="phClr"/>
-        </a:solidFill>
-        <a:gradFill rotWithShape="1">
-          <a:gsLst>
-            <a:gs pos="0">
-              <a:schemeClr val="phClr">
-                <a:tint val="50000"/>
-                <a:satMod val="300000"/>
-              </a:schemeClr>
-            </a:gs>
-            <a:gs pos="35000">
-              <a:schemeClr val="phClr">
-                <a:tint val="37000"/>
-                <a:satMod val="300000"/>
-              </a:schemeClr>
-            </a:gs>
-            <a:gs pos="100000">
-              <a:schemeClr val="phClr">
-                <a:tint val="15000"/>
-                <a:satMod val="350000"/>
-              </a:schemeClr>
-            </a:gs>
-          </a:gsLst>
-          <a:lin ang="16200000" scaled="1"/>
-        </a:gradFill>
-        <a:gradFill rotWithShape="1">
-          <a:gsLst>
-            <a:gs pos="0">
-              <a:schemeClr val="phClr">
-                <a:tint val="100000"/>
-                <a:shade val="100000"/>
-                <a:satMod val="130000"/>
-              </a:schemeClr>
-            </a:gs>
-            <a:gs pos="100000">
-              <a:schemeClr val="phClr">
-                <a:tint val="50000"/>
-                <a:shade val="100000"/>
-                <a:satMod val="350000"/>
-              </a:schemeClr>
-            </a:gs>
-          </a:gsLst>
-          <a:lin ang="16200000" scaled="0"/>
-        </a:gradFill>
-      </a:fillStyleLst>
-      <a:lnStyleLst>
-        <a:ln w="9525" cap="flat" cmpd="sng" algn="ctr">
-          <a:solidFill>
-            <a:schemeClr val="phClr">
-              <a:shade val="95000"/>
-              <a:satMod val="105000"/>
-            </a:schemeClr>
-          </a:solidFill>
-          <a:prstDash val="solid"/>
-        </a:ln>
-        <a:ln w="25400" cap="flat" cmpd="sng" algn="ctr">
-          <a:solidFill>
-            <a:schemeClr val="phClr"/>
-          </a:solidFill>
-          <a:prstDash val="solid"/>
-        </a:ln>
-        <a:ln w="38100" cap="flat" cmpd="sng" algn="ctr">
-          <a:solidFill>
-            <a:schemeClr val="phClr"/>
-          </a:solidFill>
-          <a:prstDash val="solid"/>
-        </a:ln>
-      </a:lnStyleLst>
-      <a:effectStyleLst>
-        <a:effectStyle>
-          <a:effectLst>
-            <a:outerShdw blurRad="40000" dist="20000" dir="5400000" rotWithShape="0">
-              <a:srgbClr val="000000">
-                <a:alpha val="38000"/>
-              </a:srgbClr>
-            </a:outerShdw>
-          </a:effectLst>
-        </a:effectStyle>
-        <a:effectStyle>
-          <a:effectLst>
-            <a:outerShdw blurRad="40000" dist="23000" dir="5400000" rotWithShape="0">
-              <a:srgbClr val="000000">
-                <a:alpha val="35000"/>
-              </a:srgbClr>
-            </a:outerShdw>
-          </a:effectLst>
-        </a:effectStyle>
-        <a:effectStyle>
-          <a:effectLst>
-            <a:outerShdw blurRad="40000" dist="23000" dir="5400000" rotWithShape="0">
-              <a:srgbClr val="000000">
-                <a:alpha val="35000"/>
-              </a:srgbClr>
-            </a:outerShdw>
-          </a:effectLst>
-          <a:scene3d>
-            <a:camera prst="orthographicFront">
-              <a:rot lat="0" lon="0" rev="0"/>
-            </a:camera>
-            <a:lightRig rig="threePt" dir="t">
-              <a:rot lat="0" lon="0" rev="1200000"/>
-            </a:lightRig>
-          </a:scene3d>
-          <a:sp3d>
-            <a:bevelT w="63500" h="25400"/>
-          </a:sp3d>
-        </a:effectStyle>
-      </a:effectStyleLst>
-      <a:bgFillStyleLst>
-        <a:solidFill>
-          <a:schemeClr val="phClr"/>
-        </a:solidFill>
-        <a:gradFill rotWithShape="1">
-          <a:gsLst>
-            <a:gs pos="0">
-              <a:schemeClr val="phClr">
-                <a:tint val="40000"/>
-                <a:satMod val="350000"/>
-              </a:schemeClr>
-            </a:gs>
-            <a:gs pos="40000">
-              <a:schemeClr val="phClr">
-                <a:tint val="45000"/>
-                <a:shade val="99000"/>
-                <a:satMod val="350000"/>
-              </a:schemeClr>
-            </a:gs>
-            <a:gs pos="100000">
-              <a:schemeClr val="phClr">
-                <a:shade val="20000"/>
-                <a:satMod val="255000"/>
-              </a:schemeClr>
-            </a:gs>
-          </a:gsLst>
-          <a:path path="circle">
-            <a:fillToRect l="50000" t="-80000" r="50000" b="180000"/>
-          </a:path>
-        </a:gradFill>
-        <a:gradFill rotWithShape="1">
-          <a:gsLst>
-            <a:gs pos="0">
-              <a:schemeClr val="phClr">
-                <a:tint val="80000"/>
-                <a:satMod val="300000"/>
-              </a:schemeClr>
-            </a:gs>
-            <a:gs pos="100000">
-              <a:schemeClr val="phClr">
-                <a:shade val="30000"/>
-                <a:satMod val="200000"/>
-              </a:schemeClr>
-            </a:gs>
-          </a:gsLst>
-          <a:path path="circle">
-            <a:fillToRect l="50000" t="50000" r="50000" b="50000"/>
-          </a:path>
-        </a:gradFill>
-      </a:bgFillStyleLst>
-    </a:fmtScheme>
-  </a:themeElements>
-</a:theme>
 </file>
</xml_diff>